<commit_message>
Progress with schematic: all pages entered
</commit_message>
<xml_diff>
--- a/Documents/Block Diagram.pptx
+++ b/Documents/Block Diagram.pptx
@@ -271,7 +271,7 @@
           <a:p>
             <a:fld id="{3E648055-1872-41EF-A6ED-462DADAD811E}" type="datetimeFigureOut">
               <a:rPr lang="en-US" smtClean="0"/>
-              <a:t>10/29/2020</a:t>
+              <a:t>11/11/2020</a:t>
             </a:fld>
             <a:endParaRPr lang="en-US"/>
           </a:p>
@@ -469,7 +469,7 @@
           <a:p>
             <a:fld id="{3E648055-1872-41EF-A6ED-462DADAD811E}" type="datetimeFigureOut">
               <a:rPr lang="en-US" smtClean="0"/>
-              <a:t>10/29/2020</a:t>
+              <a:t>11/11/2020</a:t>
             </a:fld>
             <a:endParaRPr lang="en-US"/>
           </a:p>
@@ -677,7 +677,7 @@
           <a:p>
             <a:fld id="{3E648055-1872-41EF-A6ED-462DADAD811E}" type="datetimeFigureOut">
               <a:rPr lang="en-US" smtClean="0"/>
-              <a:t>10/29/2020</a:t>
+              <a:t>11/11/2020</a:t>
             </a:fld>
             <a:endParaRPr lang="en-US"/>
           </a:p>
@@ -875,7 +875,7 @@
           <a:p>
             <a:fld id="{3E648055-1872-41EF-A6ED-462DADAD811E}" type="datetimeFigureOut">
               <a:rPr lang="en-US" smtClean="0"/>
-              <a:t>10/29/2020</a:t>
+              <a:t>11/11/2020</a:t>
             </a:fld>
             <a:endParaRPr lang="en-US"/>
           </a:p>
@@ -1150,7 +1150,7 @@
           <a:p>
             <a:fld id="{3E648055-1872-41EF-A6ED-462DADAD811E}" type="datetimeFigureOut">
               <a:rPr lang="en-US" smtClean="0"/>
-              <a:t>10/29/2020</a:t>
+              <a:t>11/11/2020</a:t>
             </a:fld>
             <a:endParaRPr lang="en-US"/>
           </a:p>
@@ -1415,7 +1415,7 @@
           <a:p>
             <a:fld id="{3E648055-1872-41EF-A6ED-462DADAD811E}" type="datetimeFigureOut">
               <a:rPr lang="en-US" smtClean="0"/>
-              <a:t>10/29/2020</a:t>
+              <a:t>11/11/2020</a:t>
             </a:fld>
             <a:endParaRPr lang="en-US"/>
           </a:p>
@@ -1827,7 +1827,7 @@
           <a:p>
             <a:fld id="{3E648055-1872-41EF-A6ED-462DADAD811E}" type="datetimeFigureOut">
               <a:rPr lang="en-US" smtClean="0"/>
-              <a:t>10/29/2020</a:t>
+              <a:t>11/11/2020</a:t>
             </a:fld>
             <a:endParaRPr lang="en-US"/>
           </a:p>
@@ -1968,7 +1968,7 @@
           <a:p>
             <a:fld id="{3E648055-1872-41EF-A6ED-462DADAD811E}" type="datetimeFigureOut">
               <a:rPr lang="en-US" smtClean="0"/>
-              <a:t>10/29/2020</a:t>
+              <a:t>11/11/2020</a:t>
             </a:fld>
             <a:endParaRPr lang="en-US"/>
           </a:p>
@@ -2081,7 +2081,7 @@
           <a:p>
             <a:fld id="{3E648055-1872-41EF-A6ED-462DADAD811E}" type="datetimeFigureOut">
               <a:rPr lang="en-US" smtClean="0"/>
-              <a:t>10/29/2020</a:t>
+              <a:t>11/11/2020</a:t>
             </a:fld>
             <a:endParaRPr lang="en-US"/>
           </a:p>
@@ -2392,7 +2392,7 @@
           <a:p>
             <a:fld id="{3E648055-1872-41EF-A6ED-462DADAD811E}" type="datetimeFigureOut">
               <a:rPr lang="en-US" smtClean="0"/>
-              <a:t>10/29/2020</a:t>
+              <a:t>11/11/2020</a:t>
             </a:fld>
             <a:endParaRPr lang="en-US"/>
           </a:p>
@@ -2680,7 +2680,7 @@
           <a:p>
             <a:fld id="{3E648055-1872-41EF-A6ED-462DADAD811E}" type="datetimeFigureOut">
               <a:rPr lang="en-US" smtClean="0"/>
-              <a:t>10/29/2020</a:t>
+              <a:t>11/11/2020</a:t>
             </a:fld>
             <a:endParaRPr lang="en-US"/>
           </a:p>
@@ -2921,7 +2921,7 @@
           <a:p>
             <a:fld id="{3E648055-1872-41EF-A6ED-462DADAD811E}" type="datetimeFigureOut">
               <a:rPr lang="en-US" smtClean="0"/>
-              <a:t>10/29/2020</a:t>
+              <a:t>11/11/2020</a:t>
             </a:fld>
             <a:endParaRPr lang="en-US"/>
           </a:p>
@@ -6306,10 +6306,10 @@
       </p:sp>
       <p:sp>
         <p:nvSpPr>
-          <p:cNvPr id="2" name="Rectangle: Rounded Corners 1">
-            <a:extLst>
-              <a:ext uri="{FF2B5EF4-FFF2-40B4-BE49-F238E27FC236}">
-                <a16:creationId xmlns:a16="http://schemas.microsoft.com/office/drawing/2014/main" id="{2C9C1D3E-0581-4CF2-B5B9-015681904C45}"/>
+          <p:cNvPr id="9" name="Arrow: Left-Right 8">
+            <a:extLst>
+              <a:ext uri="{FF2B5EF4-FFF2-40B4-BE49-F238E27FC236}">
+                <a16:creationId xmlns:a16="http://schemas.microsoft.com/office/drawing/2014/main" id="{8FBC1009-0533-4658-BE6D-C64372DCFD60}"/>
               </a:ext>
             </a:extLst>
           </p:cNvPr>
@@ -6318,7 +6318,141 @@
         </p:nvSpPr>
         <p:spPr>
           <a:xfrm>
-            <a:off x="9778905" y="685830"/>
+            <a:off x="2450584" y="5029169"/>
+            <a:ext cx="2707622" cy="502914"/>
+          </a:xfrm>
+          <a:prstGeom prst="leftRightArrow">
+            <a:avLst/>
+          </a:prstGeom>
+        </p:spPr>
+        <p:style>
+          <a:lnRef idx="2">
+            <a:schemeClr val="accent1">
+              <a:shade val="50000"/>
+            </a:schemeClr>
+          </a:lnRef>
+          <a:fillRef idx="1">
+            <a:schemeClr val="accent1"/>
+          </a:fillRef>
+          <a:effectRef idx="0">
+            <a:schemeClr val="accent1"/>
+          </a:effectRef>
+          <a:fontRef idx="minor">
+            <a:schemeClr val="lt1"/>
+          </a:fontRef>
+        </p:style>
+        <p:txBody>
+          <a:bodyPr rtlCol="0" anchor="ctr"/>
+          <a:lstStyle/>
+          <a:p>
+            <a:pPr algn="ctr"/>
+            <a:r>
+              <a:rPr lang="en-US" dirty="0"/>
+              <a:t>GPIO</a:t>
+            </a:r>
+          </a:p>
+        </p:txBody>
+      </p:sp>
+      <p:sp>
+        <p:nvSpPr>
+          <p:cNvPr id="4" name="TextBox 3">
+            <a:extLst>
+              <a:ext uri="{FF2B5EF4-FFF2-40B4-BE49-F238E27FC236}">
+                <a16:creationId xmlns:a16="http://schemas.microsoft.com/office/drawing/2014/main" id="{4D572C7F-8C76-43F1-8D58-B7A9082CE77D}"/>
+              </a:ext>
+            </a:extLst>
+          </p:cNvPr>
+          <p:cNvSpPr txBox="1"/>
+          <p:nvPr/>
+        </p:nvSpPr>
+        <p:spPr>
+          <a:xfrm>
+            <a:off x="4635588" y="137196"/>
+            <a:ext cx="2984920" cy="646331"/>
+          </a:xfrm>
+          <a:prstGeom prst="rect">
+            <a:avLst/>
+          </a:prstGeom>
+          <a:noFill/>
+        </p:spPr>
+        <p:txBody>
+          <a:bodyPr wrap="none" rtlCol="0">
+            <a:spAutoFit/>
+          </a:bodyPr>
+          <a:lstStyle/>
+          <a:p>
+            <a:r>
+              <a:rPr lang="en-US" sz="3600" b="1" dirty="0"/>
+              <a:t>ADC DAC GPIO</a:t>
+            </a:r>
+            <a:endParaRPr lang="en-US" sz="3600" dirty="0"/>
+          </a:p>
+        </p:txBody>
+      </p:sp>
+      <p:sp>
+        <p:nvSpPr>
+          <p:cNvPr id="10" name="Arrow: Left-Right 9">
+            <a:extLst>
+              <a:ext uri="{FF2B5EF4-FFF2-40B4-BE49-F238E27FC236}">
+                <a16:creationId xmlns:a16="http://schemas.microsoft.com/office/drawing/2014/main" id="{A7C21242-C31B-4B06-B0E6-DC99B1053F35}"/>
+              </a:ext>
+            </a:extLst>
+          </p:cNvPr>
+          <p:cNvSpPr/>
+          <p:nvPr/>
+        </p:nvSpPr>
+        <p:spPr>
+          <a:xfrm>
+            <a:off x="7056675" y="5026595"/>
+            <a:ext cx="2707622" cy="502914"/>
+          </a:xfrm>
+          <a:prstGeom prst="leftRightArrow">
+            <a:avLst/>
+          </a:prstGeom>
+        </p:spPr>
+        <p:style>
+          <a:lnRef idx="2">
+            <a:schemeClr val="accent1">
+              <a:shade val="50000"/>
+            </a:schemeClr>
+          </a:lnRef>
+          <a:fillRef idx="1">
+            <a:schemeClr val="accent1"/>
+          </a:fillRef>
+          <a:effectRef idx="0">
+            <a:schemeClr val="accent1"/>
+          </a:effectRef>
+          <a:fontRef idx="minor">
+            <a:schemeClr val="lt1"/>
+          </a:fontRef>
+        </p:style>
+        <p:txBody>
+          <a:bodyPr rtlCol="0" anchor="ctr"/>
+          <a:lstStyle/>
+          <a:p>
+            <a:pPr algn="ctr"/>
+            <a:r>
+              <a:rPr lang="en-US" dirty="0"/>
+              <a:t>GPIO</a:t>
+            </a:r>
+          </a:p>
+        </p:txBody>
+      </p:sp>
+      <p:sp>
+        <p:nvSpPr>
+          <p:cNvPr id="16" name="Rectangle: Rounded Corners 15">
+            <a:extLst>
+              <a:ext uri="{FF2B5EF4-FFF2-40B4-BE49-F238E27FC236}">
+                <a16:creationId xmlns:a16="http://schemas.microsoft.com/office/drawing/2014/main" id="{E61EB407-FE04-4683-8983-36D2195E1BC2}"/>
+              </a:ext>
+            </a:extLst>
+          </p:cNvPr>
+          <p:cNvSpPr/>
+          <p:nvPr/>
+        </p:nvSpPr>
+        <p:spPr>
+          <a:xfrm>
+            <a:off x="9764297" y="4343390"/>
             <a:ext cx="1828780" cy="1828780"/>
           </a:xfrm>
           <a:prstGeom prst="roundRect">
@@ -6354,17 +6488,17 @@
             <a:pPr algn="ctr"/>
             <a:r>
               <a:rPr lang="en-US" dirty="0"/>
-              <a:t>ADC# CH#</a:t>
-            </a:r>
-          </a:p>
-        </p:txBody>
-      </p:sp>
-      <p:sp>
-        <p:nvSpPr>
-          <p:cNvPr id="3" name="TextBox 2">
-            <a:extLst>
-              <a:ext uri="{FF2B5EF4-FFF2-40B4-BE49-F238E27FC236}">
-                <a16:creationId xmlns:a16="http://schemas.microsoft.com/office/drawing/2014/main" id="{C16D3165-FA06-4E49-B82A-22C2CBCA557E}"/>
+              <a:t>GPIO</a:t>
+            </a:r>
+          </a:p>
+        </p:txBody>
+      </p:sp>
+      <p:sp>
+        <p:nvSpPr>
+          <p:cNvPr id="24" name="TextBox 23">
+            <a:extLst>
+              <a:ext uri="{FF2B5EF4-FFF2-40B4-BE49-F238E27FC236}">
+                <a16:creationId xmlns:a16="http://schemas.microsoft.com/office/drawing/2014/main" id="{5F1FCC8C-283A-4F4B-A513-1A8353159BDC}"/>
               </a:ext>
             </a:extLst>
           </p:cNvPr>
@@ -6373,7 +6507,7 @@
         </p:nvSpPr>
         <p:spPr>
           <a:xfrm>
-            <a:off x="9817655" y="371143"/>
+            <a:off x="9793418" y="4045867"/>
             <a:ext cx="1775422" cy="369332"/>
           </a:xfrm>
           <a:prstGeom prst="rect">
@@ -6396,10 +6530,10 @@
       </p:sp>
       <p:sp>
         <p:nvSpPr>
-          <p:cNvPr id="9" name="Arrow: Left-Right 8">
-            <a:extLst>
-              <a:ext uri="{FF2B5EF4-FFF2-40B4-BE49-F238E27FC236}">
-                <a16:creationId xmlns:a16="http://schemas.microsoft.com/office/drawing/2014/main" id="{8FBC1009-0533-4658-BE6D-C64372DCFD60}"/>
+          <p:cNvPr id="14" name="Rectangle: Rounded Corners 13">
+            <a:extLst>
+              <a:ext uri="{FF2B5EF4-FFF2-40B4-BE49-F238E27FC236}">
+                <a16:creationId xmlns:a16="http://schemas.microsoft.com/office/drawing/2014/main" id="{0C152466-1CEE-4717-A044-75AC31E8F99A}"/>
               </a:ext>
             </a:extLst>
           </p:cNvPr>
@@ -6408,8 +6542,68 @@
         </p:nvSpPr>
         <p:spPr>
           <a:xfrm>
-            <a:off x="2450584" y="5029169"/>
-            <a:ext cx="2707622" cy="502914"/>
+            <a:off x="2450584" y="2513114"/>
+            <a:ext cx="1828780" cy="1828780"/>
+          </a:xfrm>
+          <a:prstGeom prst="roundRect">
+            <a:avLst/>
+          </a:prstGeom>
+        </p:spPr>
+        <p:style>
+          <a:lnRef idx="2">
+            <a:schemeClr val="accent2">
+              <a:shade val="50000"/>
+            </a:schemeClr>
+          </a:lnRef>
+          <a:fillRef idx="1">
+            <a:schemeClr val="accent2"/>
+          </a:fillRef>
+          <a:effectRef idx="0">
+            <a:schemeClr val="accent2"/>
+          </a:effectRef>
+          <a:fontRef idx="minor">
+            <a:schemeClr val="lt1"/>
+          </a:fontRef>
+        </p:style>
+        <p:txBody>
+          <a:bodyPr rtlCol="0" anchor="ctr"/>
+          <a:lstStyle/>
+          <a:p>
+            <a:pPr algn="ctr"/>
+            <a:endParaRPr lang="en-US" dirty="0"/>
+          </a:p>
+          <a:p>
+            <a:pPr algn="ctr"/>
+            <a:r>
+              <a:rPr lang="en-US" dirty="0"/>
+              <a:t>PWR, TRIG, ECHO</a:t>
+            </a:r>
+          </a:p>
+          <a:p>
+            <a:pPr algn="ctr"/>
+            <a:r>
+              <a:rPr lang="en-US" dirty="0"/>
+              <a:t> </a:t>
+            </a:r>
+          </a:p>
+        </p:txBody>
+      </p:sp>
+      <p:sp>
+        <p:nvSpPr>
+          <p:cNvPr id="15" name="Arrow: Left-Right 14">
+            <a:extLst>
+              <a:ext uri="{FF2B5EF4-FFF2-40B4-BE49-F238E27FC236}">
+                <a16:creationId xmlns:a16="http://schemas.microsoft.com/office/drawing/2014/main" id="{0A0ACD65-E101-4621-8290-015EF24CBA02}"/>
+              </a:ext>
+            </a:extLst>
+          </p:cNvPr>
+          <p:cNvSpPr/>
+          <p:nvPr/>
+        </p:nvSpPr>
+        <p:spPr>
+          <a:xfrm>
+            <a:off x="4323634" y="3183895"/>
+            <a:ext cx="847847" cy="502914"/>
           </a:xfrm>
           <a:prstGeom prst="leftRightArrow">
             <a:avLst/>
@@ -6438,17 +6632,17 @@
             <a:pPr algn="ctr"/>
             <a:r>
               <a:rPr lang="en-US" dirty="0"/>
-              <a:t>GPIO</a:t>
-            </a:r>
-          </a:p>
-        </p:txBody>
-      </p:sp>
-      <p:sp>
-        <p:nvSpPr>
-          <p:cNvPr id="4" name="TextBox 3">
-            <a:extLst>
-              <a:ext uri="{FF2B5EF4-FFF2-40B4-BE49-F238E27FC236}">
-                <a16:creationId xmlns:a16="http://schemas.microsoft.com/office/drawing/2014/main" id="{4D572C7F-8C76-43F1-8D58-B7A9082CE77D}"/>
+              <a:t>IO</a:t>
+            </a:r>
+          </a:p>
+        </p:txBody>
+      </p:sp>
+      <p:sp>
+        <p:nvSpPr>
+          <p:cNvPr id="19" name="TextBox 18">
+            <a:extLst>
+              <a:ext uri="{FF2B5EF4-FFF2-40B4-BE49-F238E27FC236}">
+                <a16:creationId xmlns:a16="http://schemas.microsoft.com/office/drawing/2014/main" id="{4A262AED-646D-4FF1-8BE7-57CE5420CF6E}"/>
               </a:ext>
             </a:extLst>
           </p:cNvPr>
@@ -6457,8 +6651,8 @@
         </p:nvSpPr>
         <p:spPr>
           <a:xfrm>
-            <a:off x="4635588" y="137196"/>
-            <a:ext cx="2984920" cy="646331"/>
+            <a:off x="2658925" y="2188999"/>
+            <a:ext cx="1424493" cy="369332"/>
           </a:xfrm>
           <a:prstGeom prst="rect">
             <a:avLst/>
@@ -6472,19 +6666,18 @@
           <a:lstStyle/>
           <a:p>
             <a:r>
-              <a:rPr lang="en-US" sz="3600" b="1" dirty="0"/>
-              <a:t>ADC DAC GPIO</a:t>
-            </a:r>
-            <a:endParaRPr lang="en-US" sz="3600" dirty="0"/>
-          </a:p>
-        </p:txBody>
-      </p:sp>
-      <p:sp>
-        <p:nvSpPr>
-          <p:cNvPr id="10" name="Arrow: Left-Right 9">
-            <a:extLst>
-              <a:ext uri="{FF2B5EF4-FFF2-40B4-BE49-F238E27FC236}">
-                <a16:creationId xmlns:a16="http://schemas.microsoft.com/office/drawing/2014/main" id="{A7C21242-C31B-4B06-B0E6-DC99B1053F35}"/>
+              <a:rPr lang="en-US" dirty="0"/>
+              <a:t>ULTRA SONIC</a:t>
+            </a:r>
+          </a:p>
+        </p:txBody>
+      </p:sp>
+      <p:sp>
+        <p:nvSpPr>
+          <p:cNvPr id="12" name="Arrow: Right 11">
+            <a:extLst>
+              <a:ext uri="{FF2B5EF4-FFF2-40B4-BE49-F238E27FC236}">
+                <a16:creationId xmlns:a16="http://schemas.microsoft.com/office/drawing/2014/main" id="{DDE17E24-364A-4A0D-BC54-52FE2448AF1F}"/>
               </a:ext>
             </a:extLst>
           </p:cNvPr>
@@ -6493,342 +6686,10 @@
         </p:nvSpPr>
         <p:spPr>
           <a:xfrm>
-            <a:off x="7056675" y="5026595"/>
-            <a:ext cx="2707622" cy="502914"/>
-          </a:xfrm>
-          <a:prstGeom prst="leftRightArrow">
-            <a:avLst/>
-          </a:prstGeom>
-        </p:spPr>
-        <p:style>
-          <a:lnRef idx="2">
-            <a:schemeClr val="accent1">
-              <a:shade val="50000"/>
-            </a:schemeClr>
-          </a:lnRef>
-          <a:fillRef idx="1">
-            <a:schemeClr val="accent1"/>
-          </a:fillRef>
-          <a:effectRef idx="0">
-            <a:schemeClr val="accent1"/>
-          </a:effectRef>
-          <a:fontRef idx="minor">
-            <a:schemeClr val="lt1"/>
-          </a:fontRef>
-        </p:style>
-        <p:txBody>
-          <a:bodyPr rtlCol="0" anchor="ctr"/>
-          <a:lstStyle/>
-          <a:p>
-            <a:pPr algn="ctr"/>
-            <a:r>
-              <a:rPr lang="en-US" dirty="0"/>
-              <a:t>GPIO</a:t>
-            </a:r>
-          </a:p>
-        </p:txBody>
-      </p:sp>
-      <p:sp>
-        <p:nvSpPr>
-          <p:cNvPr id="16" name="Rectangle: Rounded Corners 15">
-            <a:extLst>
-              <a:ext uri="{FF2B5EF4-FFF2-40B4-BE49-F238E27FC236}">
-                <a16:creationId xmlns:a16="http://schemas.microsoft.com/office/drawing/2014/main" id="{E61EB407-FE04-4683-8983-36D2195E1BC2}"/>
-              </a:ext>
-            </a:extLst>
-          </p:cNvPr>
-          <p:cNvSpPr/>
-          <p:nvPr/>
-        </p:nvSpPr>
-        <p:spPr>
-          <a:xfrm>
-            <a:off x="9764297" y="4343390"/>
-            <a:ext cx="1828780" cy="1828780"/>
-          </a:xfrm>
-          <a:prstGeom prst="roundRect">
-            <a:avLst/>
-          </a:prstGeom>
-          <a:solidFill>
-            <a:schemeClr val="accent1">
-              <a:lumMod val="60000"/>
-              <a:lumOff val="40000"/>
-            </a:schemeClr>
-          </a:solidFill>
-        </p:spPr>
-        <p:style>
-          <a:lnRef idx="2">
-            <a:schemeClr val="accent5">
-              <a:shade val="50000"/>
-            </a:schemeClr>
-          </a:lnRef>
-          <a:fillRef idx="1">
-            <a:schemeClr val="accent5"/>
-          </a:fillRef>
-          <a:effectRef idx="0">
-            <a:schemeClr val="accent5"/>
-          </a:effectRef>
-          <a:fontRef idx="minor">
-            <a:schemeClr val="lt1"/>
-          </a:fontRef>
-        </p:style>
-        <p:txBody>
-          <a:bodyPr rtlCol="0" anchor="ctr"/>
-          <a:lstStyle/>
-          <a:p>
-            <a:pPr algn="ctr"/>
-            <a:r>
-              <a:rPr lang="en-US" dirty="0"/>
-              <a:t>GPIO</a:t>
-            </a:r>
-          </a:p>
-        </p:txBody>
-      </p:sp>
-      <p:sp>
-        <p:nvSpPr>
-          <p:cNvPr id="24" name="TextBox 23">
-            <a:extLst>
-              <a:ext uri="{FF2B5EF4-FFF2-40B4-BE49-F238E27FC236}">
-                <a16:creationId xmlns:a16="http://schemas.microsoft.com/office/drawing/2014/main" id="{5F1FCC8C-283A-4F4B-A513-1A8353159BDC}"/>
-              </a:ext>
-            </a:extLst>
-          </p:cNvPr>
-          <p:cNvSpPr txBox="1"/>
-          <p:nvPr/>
-        </p:nvSpPr>
-        <p:spPr>
-          <a:xfrm>
-            <a:off x="9793418" y="4045867"/>
-            <a:ext cx="1775422" cy="369332"/>
-          </a:xfrm>
-          <a:prstGeom prst="rect">
-            <a:avLst/>
-          </a:prstGeom>
-          <a:noFill/>
-        </p:spPr>
-        <p:txBody>
-          <a:bodyPr wrap="none" rtlCol="0">
-            <a:spAutoFit/>
-          </a:bodyPr>
-          <a:lstStyle/>
-          <a:p>
-            <a:r>
-              <a:rPr lang="en-US" dirty="0"/>
-              <a:t>EXPANSION SLOT</a:t>
-            </a:r>
-          </a:p>
-        </p:txBody>
-      </p:sp>
-      <p:sp>
-        <p:nvSpPr>
-          <p:cNvPr id="14" name="Rectangle: Rounded Corners 13">
-            <a:extLst>
-              <a:ext uri="{FF2B5EF4-FFF2-40B4-BE49-F238E27FC236}">
-                <a16:creationId xmlns:a16="http://schemas.microsoft.com/office/drawing/2014/main" id="{0C152466-1CEE-4717-A044-75AC31E8F99A}"/>
-              </a:ext>
-            </a:extLst>
-          </p:cNvPr>
-          <p:cNvSpPr/>
-          <p:nvPr/>
-        </p:nvSpPr>
-        <p:spPr>
-          <a:xfrm>
-            <a:off x="2450584" y="2513114"/>
-            <a:ext cx="1828780" cy="1828780"/>
-          </a:xfrm>
-          <a:prstGeom prst="roundRect">
-            <a:avLst/>
-          </a:prstGeom>
-        </p:spPr>
-        <p:style>
-          <a:lnRef idx="2">
-            <a:schemeClr val="accent2">
-              <a:shade val="50000"/>
-            </a:schemeClr>
-          </a:lnRef>
-          <a:fillRef idx="1">
-            <a:schemeClr val="accent2"/>
-          </a:fillRef>
-          <a:effectRef idx="0">
-            <a:schemeClr val="accent2"/>
-          </a:effectRef>
-          <a:fontRef idx="minor">
-            <a:schemeClr val="lt1"/>
-          </a:fontRef>
-        </p:style>
-        <p:txBody>
-          <a:bodyPr rtlCol="0" anchor="ctr"/>
-          <a:lstStyle/>
-          <a:p>
-            <a:pPr algn="ctr"/>
-            <a:endParaRPr lang="en-US" dirty="0"/>
-          </a:p>
-          <a:p>
-            <a:pPr algn="ctr"/>
-            <a:r>
-              <a:rPr lang="en-US" dirty="0"/>
-              <a:t>PWR, TRIG, ECHO</a:t>
-            </a:r>
-          </a:p>
-          <a:p>
-            <a:pPr algn="ctr"/>
-            <a:r>
-              <a:rPr lang="en-US" dirty="0"/>
-              <a:t> </a:t>
-            </a:r>
-          </a:p>
-        </p:txBody>
-      </p:sp>
-      <p:sp>
-        <p:nvSpPr>
-          <p:cNvPr id="15" name="Arrow: Left-Right 14">
-            <a:extLst>
-              <a:ext uri="{FF2B5EF4-FFF2-40B4-BE49-F238E27FC236}">
-                <a16:creationId xmlns:a16="http://schemas.microsoft.com/office/drawing/2014/main" id="{0A0ACD65-E101-4621-8290-015EF24CBA02}"/>
-              </a:ext>
-            </a:extLst>
-          </p:cNvPr>
-          <p:cNvSpPr/>
-          <p:nvPr/>
-        </p:nvSpPr>
-        <p:spPr>
-          <a:xfrm>
-            <a:off x="4323634" y="3183895"/>
-            <a:ext cx="847847" cy="502914"/>
-          </a:xfrm>
-          <a:prstGeom prst="leftRightArrow">
-            <a:avLst/>
-          </a:prstGeom>
-        </p:spPr>
-        <p:style>
-          <a:lnRef idx="2">
-            <a:schemeClr val="accent1">
-              <a:shade val="50000"/>
-            </a:schemeClr>
-          </a:lnRef>
-          <a:fillRef idx="1">
-            <a:schemeClr val="accent1"/>
-          </a:fillRef>
-          <a:effectRef idx="0">
-            <a:schemeClr val="accent1"/>
-          </a:effectRef>
-          <a:fontRef idx="minor">
-            <a:schemeClr val="lt1"/>
-          </a:fontRef>
-        </p:style>
-        <p:txBody>
-          <a:bodyPr rtlCol="0" anchor="ctr"/>
-          <a:lstStyle/>
-          <a:p>
-            <a:pPr algn="ctr"/>
-            <a:r>
-              <a:rPr lang="en-US" dirty="0"/>
-              <a:t>IO</a:t>
-            </a:r>
-          </a:p>
-        </p:txBody>
-      </p:sp>
-      <p:sp>
-        <p:nvSpPr>
-          <p:cNvPr id="19" name="TextBox 18">
-            <a:extLst>
-              <a:ext uri="{FF2B5EF4-FFF2-40B4-BE49-F238E27FC236}">
-                <a16:creationId xmlns:a16="http://schemas.microsoft.com/office/drawing/2014/main" id="{4A262AED-646D-4FF1-8BE7-57CE5420CF6E}"/>
-              </a:ext>
-            </a:extLst>
-          </p:cNvPr>
-          <p:cNvSpPr txBox="1"/>
-          <p:nvPr/>
-        </p:nvSpPr>
-        <p:spPr>
-          <a:xfrm>
-            <a:off x="2658925" y="2188999"/>
-            <a:ext cx="1424493" cy="369332"/>
-          </a:xfrm>
-          <a:prstGeom prst="rect">
-            <a:avLst/>
-          </a:prstGeom>
-          <a:noFill/>
-        </p:spPr>
-        <p:txBody>
-          <a:bodyPr wrap="none" rtlCol="0">
-            <a:spAutoFit/>
-          </a:bodyPr>
-          <a:lstStyle/>
-          <a:p>
-            <a:r>
-              <a:rPr lang="en-US" dirty="0"/>
-              <a:t>ULTRA SONIC</a:t>
-            </a:r>
-          </a:p>
-        </p:txBody>
-      </p:sp>
-      <p:sp>
-        <p:nvSpPr>
-          <p:cNvPr id="12" name="Arrow: Right 11">
-            <a:extLst>
-              <a:ext uri="{FF2B5EF4-FFF2-40B4-BE49-F238E27FC236}">
-                <a16:creationId xmlns:a16="http://schemas.microsoft.com/office/drawing/2014/main" id="{DDE17E24-364A-4A0D-BC54-52FE2448AF1F}"/>
-              </a:ext>
-            </a:extLst>
-          </p:cNvPr>
-          <p:cNvSpPr/>
-          <p:nvPr/>
-        </p:nvSpPr>
-        <p:spPr>
-          <a:xfrm>
             <a:off x="2443946" y="1352888"/>
             <a:ext cx="2720897" cy="502914"/>
           </a:xfrm>
           <a:prstGeom prst="rightArrow">
-            <a:avLst/>
-          </a:prstGeom>
-        </p:spPr>
-        <p:style>
-          <a:lnRef idx="2">
-            <a:schemeClr val="accent1">
-              <a:shade val="50000"/>
-            </a:schemeClr>
-          </a:lnRef>
-          <a:fillRef idx="1">
-            <a:schemeClr val="accent1"/>
-          </a:fillRef>
-          <a:effectRef idx="0">
-            <a:schemeClr val="accent1"/>
-          </a:effectRef>
-          <a:fontRef idx="minor">
-            <a:schemeClr val="lt1"/>
-          </a:fontRef>
-        </p:style>
-        <p:txBody>
-          <a:bodyPr rtlCol="0" anchor="ctr"/>
-          <a:lstStyle/>
-          <a:p>
-            <a:pPr algn="ctr"/>
-            <a:r>
-              <a:rPr lang="en-US" dirty="0"/>
-              <a:t>ADC</a:t>
-            </a:r>
-          </a:p>
-        </p:txBody>
-      </p:sp>
-      <p:sp>
-        <p:nvSpPr>
-          <p:cNvPr id="18" name="Arrow: Left 17">
-            <a:extLst>
-              <a:ext uri="{FF2B5EF4-FFF2-40B4-BE49-F238E27FC236}">
-                <a16:creationId xmlns:a16="http://schemas.microsoft.com/office/drawing/2014/main" id="{94F720C8-AA86-425C-B839-64EBA7CD2087}"/>
-              </a:ext>
-            </a:extLst>
-          </p:cNvPr>
-          <p:cNvSpPr/>
-          <p:nvPr/>
-        </p:nvSpPr>
-        <p:spPr>
-          <a:xfrm>
-            <a:off x="7056675" y="1328491"/>
-            <a:ext cx="2722230" cy="502914"/>
-          </a:xfrm>
-          <a:prstGeom prst="leftArrow">
             <a:avLst/>
           </a:prstGeom>
         </p:spPr>

</xml_diff>